<commit_message>
Small update on ppt
</commit_message>
<xml_diff>
--- a/JUnit/JUnit.pptx
+++ b/JUnit/JUnit.pptx
@@ -8,13 +8,14 @@
     <p:sldId id="256" r:id="rId2"/>
     <p:sldId id="257" r:id="rId3"/>
     <p:sldId id="265" r:id="rId4"/>
-    <p:sldId id="262" r:id="rId5"/>
-    <p:sldId id="263" r:id="rId6"/>
-    <p:sldId id="264" r:id="rId7"/>
-    <p:sldId id="258" r:id="rId8"/>
-    <p:sldId id="260" r:id="rId9"/>
-    <p:sldId id="261" r:id="rId10"/>
-    <p:sldId id="259" r:id="rId11"/>
+    <p:sldId id="266" r:id="rId5"/>
+    <p:sldId id="262" r:id="rId6"/>
+    <p:sldId id="263" r:id="rId7"/>
+    <p:sldId id="264" r:id="rId8"/>
+    <p:sldId id="258" r:id="rId9"/>
+    <p:sldId id="260" r:id="rId10"/>
+    <p:sldId id="261" r:id="rId11"/>
+    <p:sldId id="259" r:id="rId12"/>
   </p:sldIdLst>
   <p:sldSz cx="9144000" cy="6858000" type="screen4x3"/>
   <p:notesSz cx="6858000" cy="9144000"/>
@@ -297,7 +298,7 @@
           <a:p>
             <a:fld id="{71C4DD77-61D0-EA49-AA6A-832BB918BB10}" type="datetimeFigureOut">
               <a:rPr lang="en-US" smtClean="0"/>
-              <a:t>10/03/16</a:t>
+              <a:t>11/03/16</a:t>
             </a:fld>
             <a:endParaRPr lang="en-US"/>
           </a:p>
@@ -467,7 +468,7 @@
           <a:p>
             <a:fld id="{71C4DD77-61D0-EA49-AA6A-832BB918BB10}" type="datetimeFigureOut">
               <a:rPr lang="en-US" smtClean="0"/>
-              <a:t>10/03/16</a:t>
+              <a:t>11/03/16</a:t>
             </a:fld>
             <a:endParaRPr lang="en-US"/>
           </a:p>
@@ -647,7 +648,7 @@
           <a:p>
             <a:fld id="{71C4DD77-61D0-EA49-AA6A-832BB918BB10}" type="datetimeFigureOut">
               <a:rPr lang="en-US" smtClean="0"/>
-              <a:t>10/03/16</a:t>
+              <a:t>11/03/16</a:t>
             </a:fld>
             <a:endParaRPr lang="en-US"/>
           </a:p>
@@ -817,7 +818,7 @@
           <a:p>
             <a:fld id="{71C4DD77-61D0-EA49-AA6A-832BB918BB10}" type="datetimeFigureOut">
               <a:rPr lang="en-US" smtClean="0"/>
-              <a:t>10/03/16</a:t>
+              <a:t>11/03/16</a:t>
             </a:fld>
             <a:endParaRPr lang="en-US"/>
           </a:p>
@@ -1063,7 +1064,7 @@
           <a:p>
             <a:fld id="{71C4DD77-61D0-EA49-AA6A-832BB918BB10}" type="datetimeFigureOut">
               <a:rPr lang="en-US" smtClean="0"/>
-              <a:t>10/03/16</a:t>
+              <a:t>11/03/16</a:t>
             </a:fld>
             <a:endParaRPr lang="en-US"/>
           </a:p>
@@ -1351,7 +1352,7 @@
           <a:p>
             <a:fld id="{71C4DD77-61D0-EA49-AA6A-832BB918BB10}" type="datetimeFigureOut">
               <a:rPr lang="en-US" smtClean="0"/>
-              <a:t>10/03/16</a:t>
+              <a:t>11/03/16</a:t>
             </a:fld>
             <a:endParaRPr lang="en-US"/>
           </a:p>
@@ -1773,7 +1774,7 @@
           <a:p>
             <a:fld id="{71C4DD77-61D0-EA49-AA6A-832BB918BB10}" type="datetimeFigureOut">
               <a:rPr lang="en-US" smtClean="0"/>
-              <a:t>10/03/16</a:t>
+              <a:t>11/03/16</a:t>
             </a:fld>
             <a:endParaRPr lang="en-US"/>
           </a:p>
@@ -1891,7 +1892,7 @@
           <a:p>
             <a:fld id="{71C4DD77-61D0-EA49-AA6A-832BB918BB10}" type="datetimeFigureOut">
               <a:rPr lang="en-US" smtClean="0"/>
-              <a:t>10/03/16</a:t>
+              <a:t>11/03/16</a:t>
             </a:fld>
             <a:endParaRPr lang="en-US"/>
           </a:p>
@@ -1986,7 +1987,7 @@
           <a:p>
             <a:fld id="{71C4DD77-61D0-EA49-AA6A-832BB918BB10}" type="datetimeFigureOut">
               <a:rPr lang="en-US" smtClean="0"/>
-              <a:t>10/03/16</a:t>
+              <a:t>11/03/16</a:t>
             </a:fld>
             <a:endParaRPr lang="en-US"/>
           </a:p>
@@ -2263,7 +2264,7 @@
           <a:p>
             <a:fld id="{71C4DD77-61D0-EA49-AA6A-832BB918BB10}" type="datetimeFigureOut">
               <a:rPr lang="en-US" smtClean="0"/>
-              <a:t>10/03/16</a:t>
+              <a:t>11/03/16</a:t>
             </a:fld>
             <a:endParaRPr lang="en-US"/>
           </a:p>
@@ -2516,7 +2517,7 @@
           <a:p>
             <a:fld id="{71C4DD77-61D0-EA49-AA6A-832BB918BB10}" type="datetimeFigureOut">
               <a:rPr lang="en-US" smtClean="0"/>
-              <a:t>10/03/16</a:t>
+              <a:t>11/03/16</a:t>
             </a:fld>
             <a:endParaRPr lang="en-US"/>
           </a:p>
@@ -2729,7 +2730,7 @@
           <a:p>
             <a:fld id="{71C4DD77-61D0-EA49-AA6A-832BB918BB10}" type="datetimeFigureOut">
               <a:rPr lang="en-US" smtClean="0"/>
-              <a:t>10/03/16</a:t>
+              <a:t>11/03/16</a:t>
             </a:fld>
             <a:endParaRPr lang="en-US"/>
           </a:p>
@@ -3245,7 +3246,7 @@
                   <a:srgbClr val="9BBB59"/>
                 </a:solidFill>
               </a:rPr>
-              <a:t>References</a:t>
+              <a:t>The CORRECT way</a:t>
             </a:r>
             <a:endParaRPr lang="en-US" dirty="0">
               <a:solidFill>
@@ -3265,11 +3266,204 @@
             <p:ph idx="1"/>
           </p:nvPr>
         </p:nvSpPr>
-        <p:spPr/>
-        <p:txBody>
-          <a:bodyPr/>
-          <a:lstStyle/>
-          <a:p>
+        <p:spPr>
+          <a:xfrm>
+            <a:off x="457200" y="1600200"/>
+            <a:ext cx="8229600" cy="4917604"/>
+          </a:xfrm>
+        </p:spPr>
+        <p:txBody>
+          <a:bodyPr>
+            <a:normAutofit fontScale="85000" lnSpcReduction="20000"/>
+          </a:bodyPr>
+          <a:lstStyle/>
+          <a:p>
+            <a:pPr>
+              <a:buClr>
+                <a:schemeClr val="accent3"/>
+              </a:buClr>
+            </a:pPr>
+            <a:r>
+              <a:rPr lang="en-US" dirty="0" smtClean="0">
+                <a:solidFill>
+                  <a:srgbClr val="9BBB59"/>
+                </a:solidFill>
+              </a:rPr>
+              <a:t>Conformance</a:t>
+            </a:r>
+            <a:r>
+              <a:rPr lang="en-US" dirty="0" smtClean="0"/>
+              <a:t>: Does the value conform to an expected format?</a:t>
+            </a:r>
+          </a:p>
+          <a:p>
+            <a:r>
+              <a:rPr lang="en-US" dirty="0" smtClean="0">
+                <a:solidFill>
+                  <a:srgbClr val="9BBB59"/>
+                </a:solidFill>
+              </a:rPr>
+              <a:t>Ordering</a:t>
+            </a:r>
+            <a:r>
+              <a:rPr lang="en-US" dirty="0" smtClean="0"/>
+              <a:t>: Is the set of values ordered or unordered as appropriate?</a:t>
+            </a:r>
+          </a:p>
+          <a:p>
+            <a:r>
+              <a:rPr lang="en-US" dirty="0" smtClean="0">
+                <a:solidFill>
+                  <a:srgbClr val="9BBB59"/>
+                </a:solidFill>
+              </a:rPr>
+              <a:t>Range</a:t>
+            </a:r>
+            <a:r>
+              <a:rPr lang="en-US" dirty="0" smtClean="0"/>
+              <a:t>: Is the value within reasonable minimum and maximum values?</a:t>
+            </a:r>
+          </a:p>
+          <a:p>
+            <a:r>
+              <a:rPr lang="en-US" dirty="0" smtClean="0">
+                <a:solidFill>
+                  <a:srgbClr val="9BBB59"/>
+                </a:solidFill>
+              </a:rPr>
+              <a:t>Reference</a:t>
+            </a:r>
+            <a:r>
+              <a:rPr lang="en-US" dirty="0" smtClean="0"/>
+              <a:t>: Does the code reference anything external that isn’t under direct control of the code itself?</a:t>
+            </a:r>
+          </a:p>
+          <a:p>
+            <a:r>
+              <a:rPr lang="en-US" dirty="0" smtClean="0">
+                <a:solidFill>
+                  <a:srgbClr val="9BBB59"/>
+                </a:solidFill>
+              </a:rPr>
+              <a:t>Existence</a:t>
+            </a:r>
+            <a:r>
+              <a:rPr lang="en-US" dirty="0" smtClean="0"/>
+              <a:t>: Does the value exist (is it non-null, nonzero, present in a set, and so on)?</a:t>
+            </a:r>
+          </a:p>
+          <a:p>
+            <a:r>
+              <a:rPr lang="en-US" dirty="0" smtClean="0">
+                <a:solidFill>
+                  <a:srgbClr val="9BBB59"/>
+                </a:solidFill>
+              </a:rPr>
+              <a:t>Cardinality</a:t>
+            </a:r>
+            <a:r>
+              <a:rPr lang="en-US" dirty="0" smtClean="0"/>
+              <a:t>: Are there exactly enough values?</a:t>
+            </a:r>
+          </a:p>
+          <a:p>
+            <a:r>
+              <a:rPr lang="en-US" dirty="0" smtClean="0">
+                <a:solidFill>
+                  <a:srgbClr val="9BBB59"/>
+                </a:solidFill>
+              </a:rPr>
+              <a:t>Time</a:t>
+            </a:r>
+            <a:r>
+              <a:rPr lang="en-US" dirty="0" smtClean="0"/>
+              <a:t>: Is everything happening in order? At the right time? In time?</a:t>
+            </a:r>
+            <a:endParaRPr lang="en-US" dirty="0"/>
+          </a:p>
+        </p:txBody>
+      </p:sp>
+    </p:spTree>
+    <p:extLst>
+      <p:ext uri="{BB962C8B-B14F-4D97-AF65-F5344CB8AC3E}">
+        <p14:creationId xmlns:p14="http://schemas.microsoft.com/office/powerpoint/2010/main" val="2637121010"/>
+      </p:ext>
+    </p:extLst>
+  </p:cSld>
+  <p:clrMapOvr>
+    <a:masterClrMapping/>
+  </p:clrMapOvr>
+</p:sld>
+</file>
+
+<file path=ppt/slides/slide11.xml><?xml version="1.0" encoding="utf-8"?>
+<p:sld xmlns:a="http://schemas.openxmlformats.org/drawingml/2006/main" xmlns:r="http://schemas.openxmlformats.org/officeDocument/2006/relationships" xmlns:p="http://schemas.openxmlformats.org/presentationml/2006/main">
+  <p:cSld>
+    <p:spTree>
+      <p:nvGrpSpPr>
+        <p:cNvPr id="1" name=""/>
+        <p:cNvGrpSpPr/>
+        <p:nvPr/>
+      </p:nvGrpSpPr>
+      <p:grpSpPr>
+        <a:xfrm>
+          <a:off x="0" y="0"/>
+          <a:ext cx="0" cy="0"/>
+          <a:chOff x="0" y="0"/>
+          <a:chExt cx="0" cy="0"/>
+        </a:xfrm>
+      </p:grpSpPr>
+      <p:sp>
+        <p:nvSpPr>
+          <p:cNvPr id="2" name="Title 1"/>
+          <p:cNvSpPr>
+            <a:spLocks noGrp="1"/>
+          </p:cNvSpPr>
+          <p:nvPr>
+            <p:ph type="title"/>
+          </p:nvPr>
+        </p:nvSpPr>
+        <p:spPr/>
+        <p:txBody>
+          <a:bodyPr/>
+          <a:lstStyle/>
+          <a:p>
+            <a:r>
+              <a:rPr lang="en-US" dirty="0" smtClean="0">
+                <a:solidFill>
+                  <a:srgbClr val="9BBB59"/>
+                </a:solidFill>
+              </a:rPr>
+              <a:t>References</a:t>
+            </a:r>
+            <a:endParaRPr lang="en-US" dirty="0">
+              <a:solidFill>
+                <a:srgbClr val="9BBB59"/>
+              </a:solidFill>
+            </a:endParaRPr>
+          </a:p>
+        </p:txBody>
+      </p:sp>
+      <p:sp>
+        <p:nvSpPr>
+          <p:cNvPr id="3" name="Content Placeholder 2"/>
+          <p:cNvSpPr>
+            <a:spLocks noGrp="1"/>
+          </p:cNvSpPr>
+          <p:nvPr>
+            <p:ph idx="1"/>
+          </p:nvPr>
+        </p:nvSpPr>
+        <p:spPr/>
+        <p:txBody>
+          <a:bodyPr/>
+          <a:lstStyle/>
+          <a:p>
+            <a:pPr>
+              <a:buClr>
+                <a:schemeClr val="accent3"/>
+              </a:buClr>
+            </a:pPr>
             <a:r>
               <a:rPr lang="en-US" dirty="0" smtClean="0"/>
               <a:t>Pragmatic Unit Testing in Java 8 with </a:t>
@@ -3278,6 +3472,40 @@
               <a:rPr lang="en-US" dirty="0" err="1" smtClean="0"/>
               <a:t>JUnit</a:t>
             </a:r>
+            <a:endParaRPr lang="en-US" dirty="0" smtClean="0"/>
+          </a:p>
+          <a:p>
+            <a:pPr>
+              <a:buClr>
+                <a:schemeClr val="accent3"/>
+              </a:buClr>
+            </a:pPr>
+            <a:r>
+              <a:rPr lang="en-US" dirty="0"/>
+              <a:t>Testing with </a:t>
+            </a:r>
+            <a:r>
+              <a:rPr lang="en-US" dirty="0" err="1" smtClean="0"/>
+              <a:t>JUnit</a:t>
+            </a:r>
+            <a:endParaRPr lang="en-US" dirty="0"/>
+          </a:p>
+          <a:p>
+            <a:pPr>
+              <a:buClr>
+                <a:schemeClr val="accent3"/>
+              </a:buClr>
+            </a:pPr>
+            <a:r>
+              <a:rPr lang="en-US" dirty="0" err="1" smtClean="0"/>
+              <a:t>Junit</a:t>
+            </a:r>
+            <a:r>
+              <a:rPr lang="en-US" dirty="0" smtClean="0"/>
+              <a:t> Recipes</a:t>
+            </a:r>
+          </a:p>
+          <a:p>
             <a:endParaRPr lang="en-US" dirty="0"/>
           </a:p>
         </p:txBody>
@@ -3358,30 +3586,55 @@
           <a:bodyPr/>
           <a:lstStyle/>
           <a:p>
+            <a:pPr>
+              <a:buClr>
+                <a:schemeClr val="accent3"/>
+              </a:buClr>
+            </a:pPr>
             <a:r>
               <a:rPr lang="en-US" dirty="0" smtClean="0"/>
               <a:t>Is an open source framework</a:t>
             </a:r>
           </a:p>
           <a:p>
+            <a:pPr>
+              <a:buClr>
+                <a:schemeClr val="accent3"/>
+              </a:buClr>
+            </a:pPr>
             <a:r>
               <a:rPr lang="en-US" dirty="0" smtClean="0"/>
               <a:t>Runs Java Test</a:t>
             </a:r>
           </a:p>
           <a:p>
+            <a:pPr>
+              <a:buClr>
+                <a:schemeClr val="accent3"/>
+              </a:buClr>
+            </a:pPr>
             <a:r>
               <a:rPr lang="en-US" dirty="0" smtClean="0"/>
               <a:t>Can be used in TDD</a:t>
             </a:r>
           </a:p>
           <a:p>
+            <a:pPr>
+              <a:buClr>
+                <a:schemeClr val="accent3"/>
+              </a:buClr>
+            </a:pPr>
             <a:r>
               <a:rPr lang="en-US" dirty="0" smtClean="0"/>
               <a:t>Is currently in version 4</a:t>
             </a:r>
           </a:p>
           <a:p>
+            <a:pPr>
+              <a:buClr>
+                <a:schemeClr val="accent3"/>
+              </a:buClr>
+            </a:pPr>
             <a:endParaRPr lang="en-US" dirty="0"/>
           </a:p>
         </p:txBody>
@@ -3459,7 +3712,9 @@
         </p:nvSpPr>
         <p:spPr/>
         <p:txBody>
-          <a:bodyPr/>
+          <a:bodyPr>
+            <a:normAutofit/>
+          </a:bodyPr>
           <a:lstStyle/>
           <a:p>
             <a:pPr marL="514350" indent="-514350">
@@ -3517,7 +3772,7 @@
                   <a:schemeClr val="accent3"/>
                 </a:solidFill>
               </a:rPr>
-              <a:t>Run tests</a:t>
+              <a:t>Compile testing class</a:t>
             </a:r>
           </a:p>
           <a:p>
@@ -3525,46 +3780,73 @@
               <a:buNone/>
             </a:pPr>
             <a:r>
-              <a:rPr lang="en-US" dirty="0" smtClean="0"/>
-              <a:t>java </a:t>
-            </a:r>
-            <a:r>
-              <a:rPr lang="en-US" dirty="0"/>
-              <a:t>-</a:t>
-            </a:r>
-            <a:r>
-              <a:rPr lang="en-US" dirty="0" err="1"/>
+              <a:rPr lang="hr-HR" dirty="0"/>
+              <a:t>javac -cp .:junit-</a:t>
+            </a:r>
+            <a:r>
+              <a:rPr lang="hr-HR" dirty="0" smtClean="0"/>
+              <a:t>4.12.jar CalculatorTest.java</a:t>
+            </a:r>
+          </a:p>
+          <a:p>
+            <a:pPr marL="514350" lvl="1" indent="-514350">
+              <a:buFont typeface="+mj-lt"/>
+              <a:buAutoNum type="arabicPeriod" startAt="3"/>
+            </a:pPr>
+            <a:r>
+              <a:rPr lang="en-US" sz="3200" dirty="0" smtClean="0">
+                <a:solidFill>
+                  <a:schemeClr val="accent3"/>
+                </a:solidFill>
+              </a:rPr>
+              <a:t>Run test</a:t>
+            </a:r>
+            <a:endParaRPr lang="hr-HR" sz="3200" dirty="0">
+              <a:solidFill>
+                <a:schemeClr val="accent3"/>
+              </a:solidFill>
+            </a:endParaRPr>
+          </a:p>
+          <a:p>
+            <a:pPr marL="400050" lvl="1" indent="0">
+              <a:buNone/>
+            </a:pPr>
+            <a:r>
+              <a:rPr lang="it-IT" dirty="0"/>
+              <a:t>java -</a:t>
+            </a:r>
+            <a:r>
+              <a:rPr lang="it-IT" dirty="0" err="1"/>
               <a:t>cp</a:t>
             </a:r>
             <a:r>
-              <a:rPr lang="en-US" dirty="0"/>
-              <a:t> .:/</a:t>
-            </a:r>
-            <a:r>
-              <a:rPr lang="en-US" dirty="0" err="1"/>
-              <a:t>usr</a:t>
-            </a:r>
-            <a:r>
-              <a:rPr lang="en-US" dirty="0"/>
-              <a:t>/share/java/</a:t>
-            </a:r>
-            <a:r>
-              <a:rPr lang="en-US" dirty="0" err="1"/>
-              <a:t>junit.jar</a:t>
-            </a:r>
-            <a:r>
-              <a:rPr lang="en-US" dirty="0"/>
+              <a:rPr lang="it-IT" dirty="0"/>
+              <a:t> .:junit-4.XX.jar:hamcrest-core-1.3.jar </a:t>
+            </a:r>
+            <a:r>
+              <a:rPr lang="it-IT" dirty="0" err="1"/>
+              <a:t>org.junit.runner.JUnitCore</a:t>
+            </a:r>
+            <a:r>
+              <a:rPr lang="it-IT" dirty="0"/>
               <a:t> </a:t>
             </a:r>
             <a:r>
-              <a:rPr lang="en-US" dirty="0" err="1"/>
-              <a:t>org.junit.runner.JUnitCore</a:t>
-            </a:r>
-            <a:r>
-              <a:rPr lang="en-US" dirty="0"/>
-              <a:t> [test class name]</a:t>
-            </a:r>
-            <a:endParaRPr lang="en-US" dirty="0"/>
+              <a:rPr lang="it-IT" dirty="0" err="1"/>
+              <a:t>CalculatorTest</a:t>
+            </a:r>
+            <a:endParaRPr lang="hr-HR" dirty="0"/>
+          </a:p>
+          <a:p>
+            <a:pPr marL="514350" indent="-514350">
+              <a:buFont typeface="+mj-lt"/>
+              <a:buAutoNum type="arabicPeriod"/>
+            </a:pPr>
+            <a:endParaRPr lang="en-US" dirty="0" smtClean="0">
+              <a:solidFill>
+                <a:schemeClr val="accent3"/>
+              </a:solidFill>
+            </a:endParaRPr>
           </a:p>
         </p:txBody>
       </p:sp>
@@ -3619,8 +3901,13 @@
                   <a:srgbClr val="9BBB59"/>
                 </a:solidFill>
               </a:rPr>
-              <a:t>Asserts</a:t>
-            </a:r>
+              <a:t>Annotations</a:t>
+            </a:r>
+            <a:endParaRPr lang="en-US" dirty="0">
+              <a:solidFill>
+                <a:srgbClr val="9BBB59"/>
+              </a:solidFill>
+            </a:endParaRPr>
           </a:p>
         </p:txBody>
       </p:sp>
@@ -3634,188 +3921,157 @@
             <p:ph idx="1"/>
           </p:nvPr>
         </p:nvSpPr>
-        <p:spPr>
-          <a:xfrm>
-            <a:off x="457200" y="1600200"/>
-            <a:ext cx="8229600" cy="4791993"/>
-          </a:xfrm>
-        </p:spPr>
+        <p:spPr/>
         <p:txBody>
           <a:bodyPr>
-            <a:normAutofit/>
+            <a:normAutofit fontScale="92500" lnSpcReduction="10000"/>
           </a:bodyPr>
           <a:lstStyle/>
           <a:p>
+            <a:pPr>
+              <a:buClr>
+                <a:schemeClr val="accent3"/>
+              </a:buClr>
+            </a:pPr>
+            <a:r>
+              <a:rPr lang="en-US" dirty="0"/>
+              <a:t>@Test </a:t>
+            </a:r>
+            <a:endParaRPr lang="en-US" dirty="0" smtClean="0"/>
+          </a:p>
+          <a:p>
+            <a:pPr lvl="1">
+              <a:buClr>
+                <a:schemeClr val="accent3"/>
+              </a:buClr>
+            </a:pPr>
+            <a:r>
+              <a:rPr lang="en-US" dirty="0"/>
+              <a:t>@Test(expected=</a:t>
+            </a:r>
+            <a:r>
+              <a:rPr lang="en-US" dirty="0" err="1"/>
+              <a:t>IndexOutOfBoundsException.class</a:t>
+            </a:r>
             <a:r>
               <a:rPr lang="en-US" dirty="0" smtClean="0"/>
-              <a:t>void </a:t>
-            </a:r>
-            <a:r>
-              <a:rPr lang="en-US" dirty="0" err="1" smtClean="0"/>
-              <a:t>assertEquals</a:t>
-            </a:r>
+              <a:t>)</a:t>
+            </a:r>
+          </a:p>
+          <a:p>
+            <a:pPr lvl="1">
+              <a:buClr>
+                <a:schemeClr val="accent3"/>
+              </a:buClr>
+            </a:pPr>
+            <a:r>
+              <a:rPr lang="en-US" dirty="0"/>
+              <a:t>@Test(timeout=100) </a:t>
+            </a:r>
+            <a:endParaRPr lang="en-US" dirty="0" smtClean="0"/>
+          </a:p>
+          <a:p>
+            <a:pPr>
+              <a:buClr>
+                <a:schemeClr val="accent3"/>
+              </a:buClr>
+            </a:pPr>
             <a:r>
               <a:rPr lang="en-US" dirty="0" smtClean="0"/>
-              <a:t>(string </a:t>
-            </a:r>
-            <a:r>
-              <a:rPr lang="en-US" dirty="0" err="1" smtClean="0"/>
-              <a:t>msg</a:t>
-            </a:r>
+              <a:t>@</a:t>
+            </a:r>
+            <a:r>
+              <a:rPr lang="en-US" dirty="0"/>
+              <a:t>Before </a:t>
+            </a:r>
+            <a:endParaRPr lang="en-US" dirty="0" smtClean="0"/>
+          </a:p>
+          <a:p>
+            <a:pPr>
+              <a:buClr>
+                <a:schemeClr val="accent3"/>
+              </a:buClr>
+            </a:pPr>
             <a:r>
               <a:rPr lang="en-US" dirty="0" smtClean="0"/>
-              <a:t>, </a:t>
-            </a:r>
-            <a:r>
-              <a:rPr lang="en-US" dirty="0" err="1" smtClean="0"/>
-              <a:t>boolean</a:t>
-            </a:r>
+              <a:t>@</a:t>
+            </a:r>
+            <a:r>
+              <a:rPr lang="en-US" dirty="0"/>
+              <a:t>After </a:t>
+            </a:r>
+            <a:endParaRPr lang="en-US" dirty="0" smtClean="0"/>
+          </a:p>
+          <a:p>
+            <a:pPr>
+              <a:buClr>
+                <a:schemeClr val="accent3"/>
+              </a:buClr>
+            </a:pPr>
             <a:r>
               <a:rPr lang="en-US" dirty="0" smtClean="0"/>
-              <a:t> </a:t>
-            </a:r>
-            <a:r>
-              <a:rPr lang="en-US" dirty="0" smtClean="0"/>
-              <a:t>expected, </a:t>
-            </a:r>
-            <a:r>
-              <a:rPr lang="en-US" dirty="0" err="1" smtClean="0"/>
-              <a:t>boolean</a:t>
-            </a:r>
-            <a:r>
-              <a:rPr lang="en-US" dirty="0" smtClean="0"/>
-              <a:t> actual)</a:t>
-            </a:r>
-          </a:p>
-          <a:p>
-            <a:r>
-              <a:rPr lang="en-US" dirty="0" smtClean="0"/>
-              <a:t>void </a:t>
-            </a:r>
-            <a:r>
-              <a:rPr lang="en-US" dirty="0" err="1" smtClean="0"/>
-              <a:t>assertTrue</a:t>
-            </a:r>
-            <a:r>
-              <a:rPr lang="en-US" dirty="0"/>
-              <a:t>(string </a:t>
+              <a:t>@</a:t>
             </a:r>
             <a:r>
               <a:rPr lang="en-US" dirty="0" err="1"/>
-              <a:t>msg</a:t>
-            </a:r>
-            <a:r>
-              <a:rPr lang="en-US" dirty="0"/>
-              <a:t>, </a:t>
-            </a:r>
-            <a:r>
-              <a:rPr lang="en-US" dirty="0" err="1"/>
-              <a:t>boolean</a:t>
+              <a:t>AfterClass</a:t>
             </a:r>
             <a:r>
               <a:rPr lang="en-US" dirty="0"/>
               <a:t> </a:t>
             </a:r>
+            <a:endParaRPr lang="en-US" dirty="0" smtClean="0"/>
+          </a:p>
+          <a:p>
+            <a:pPr>
+              <a:buClr>
+                <a:schemeClr val="accent3"/>
+              </a:buClr>
+            </a:pPr>
             <a:r>
               <a:rPr lang="en-US" dirty="0" smtClean="0"/>
-              <a:t>expected, </a:t>
-            </a:r>
-            <a:r>
-              <a:rPr lang="en-US" dirty="0" err="1" smtClean="0"/>
-              <a:t>boolean</a:t>
-            </a:r>
-            <a:r>
-              <a:rPr lang="en-US" dirty="0" smtClean="0"/>
-              <a:t> actual)</a:t>
-            </a:r>
-          </a:p>
-          <a:p>
-            <a:r>
-              <a:rPr lang="en-US" dirty="0" smtClean="0"/>
-              <a:t>void </a:t>
-            </a:r>
-            <a:r>
-              <a:rPr lang="en-US" dirty="0" err="1" smtClean="0"/>
-              <a:t>assertFalse</a:t>
-            </a:r>
-            <a:r>
-              <a:rPr lang="en-US" dirty="0"/>
-              <a:t>(string </a:t>
+              <a:t>@</a:t>
             </a:r>
             <a:r>
               <a:rPr lang="en-US" dirty="0" err="1"/>
-              <a:t>msg</a:t>
-            </a:r>
-            <a:r>
-              <a:rPr lang="en-US" dirty="0"/>
-              <a:t>, </a:t>
-            </a:r>
-            <a:r>
-              <a:rPr lang="en-US" dirty="0" err="1"/>
-              <a:t>boolean</a:t>
+              <a:t>BeforeClass</a:t>
             </a:r>
             <a:r>
               <a:rPr lang="en-US" dirty="0"/>
               <a:t> </a:t>
             </a:r>
+            <a:endParaRPr lang="en-US" dirty="0" smtClean="0"/>
+          </a:p>
+          <a:p>
+            <a:pPr>
+              <a:buClr>
+                <a:schemeClr val="accent3"/>
+              </a:buClr>
+            </a:pPr>
             <a:r>
               <a:rPr lang="en-US" dirty="0" smtClean="0"/>
-              <a:t>condition)</a:t>
-            </a:r>
-          </a:p>
-          <a:p>
+              <a:t>@</a:t>
+            </a:r>
+            <a:r>
+              <a:rPr lang="en-US" dirty="0"/>
+              <a:t>Ignore </a:t>
+            </a:r>
+            <a:endParaRPr lang="en-US" dirty="0" smtClean="0"/>
+          </a:p>
+          <a:p>
+            <a:pPr>
+              <a:buClr>
+                <a:schemeClr val="accent3"/>
+              </a:buClr>
+            </a:pPr>
             <a:r>
               <a:rPr lang="en-US" dirty="0" smtClean="0"/>
-              <a:t>void </a:t>
-            </a:r>
-            <a:r>
-              <a:rPr lang="en-US" dirty="0" err="1" smtClean="0"/>
-              <a:t>assertNotNull</a:t>
-            </a:r>
-            <a:r>
-              <a:rPr lang="en-US" dirty="0"/>
-              <a:t>(string </a:t>
+              <a:t>@</a:t>
             </a:r>
             <a:r>
               <a:rPr lang="en-US" dirty="0" err="1"/>
-              <a:t>msg</a:t>
-            </a:r>
-            <a:r>
-              <a:rPr lang="en-US" dirty="0"/>
-              <a:t>, Object </a:t>
-            </a:r>
-            <a:r>
-              <a:rPr lang="en-US" dirty="0" smtClean="0"/>
-              <a:t>object)</a:t>
-            </a:r>
-          </a:p>
-          <a:p>
-            <a:r>
-              <a:rPr lang="en-US" dirty="0" smtClean="0"/>
-              <a:t>void </a:t>
-            </a:r>
-            <a:r>
-              <a:rPr lang="en-US" dirty="0" err="1" smtClean="0"/>
-              <a:t>assertNull</a:t>
-            </a:r>
-            <a:r>
-              <a:rPr lang="en-US" dirty="0"/>
-              <a:t>(string </a:t>
-            </a:r>
-            <a:r>
-              <a:rPr lang="en-US" dirty="0" err="1"/>
-              <a:t>msg</a:t>
-            </a:r>
-            <a:r>
-              <a:rPr lang="en-US" dirty="0"/>
-              <a:t>, Object </a:t>
-            </a:r>
-            <a:r>
-              <a:rPr lang="en-US" dirty="0" smtClean="0"/>
-              <a:t>object)</a:t>
-            </a:r>
-          </a:p>
-          <a:p>
+              <a:t>Runwith</a:t>
+            </a:r>
             <a:endParaRPr lang="en-US" dirty="0"/>
           </a:p>
         </p:txBody>
@@ -3823,7 +4079,7 @@
     </p:spTree>
     <p:extLst>
       <p:ext uri="{BB962C8B-B14F-4D97-AF65-F5344CB8AC3E}">
-        <p14:creationId xmlns:p14="http://schemas.microsoft.com/office/powerpoint/2010/main" val="2488630902"/>
+        <p14:creationId xmlns:p14="http://schemas.microsoft.com/office/powerpoint/2010/main" val="1042349246"/>
       </p:ext>
     </p:extLst>
   </p:cSld>
@@ -3886,18 +4142,73 @@
             <p:ph idx="1"/>
           </p:nvPr>
         </p:nvSpPr>
-        <p:spPr/>
-        <p:txBody>
-          <a:bodyPr/>
-          <a:lstStyle/>
-          <a:p>
-            <a:r>
-              <a:rPr lang="en-US" dirty="0"/>
+        <p:spPr>
+          <a:xfrm>
+            <a:off x="457200" y="1600200"/>
+            <a:ext cx="8229600" cy="4791993"/>
+          </a:xfrm>
+        </p:spPr>
+        <p:txBody>
+          <a:bodyPr>
+            <a:normAutofit/>
+          </a:bodyPr>
+          <a:lstStyle/>
+          <a:p>
+            <a:pPr>
+              <a:buClr>
+                <a:schemeClr val="accent3"/>
+              </a:buClr>
+            </a:pPr>
+            <a:r>
+              <a:rPr lang="en-US" dirty="0" smtClean="0"/>
               <a:t>void </a:t>
             </a:r>
             <a:r>
-              <a:rPr lang="en-US" dirty="0" err="1"/>
-              <a:t>assertSame</a:t>
+              <a:rPr lang="en-US" dirty="0" err="1" smtClean="0"/>
+              <a:t>assertEquals</a:t>
+            </a:r>
+            <a:r>
+              <a:rPr lang="en-US" dirty="0" smtClean="0"/>
+              <a:t>(string </a:t>
+            </a:r>
+            <a:r>
+              <a:rPr lang="en-US" dirty="0" err="1" smtClean="0"/>
+              <a:t>msg</a:t>
+            </a:r>
+            <a:r>
+              <a:rPr lang="en-US" dirty="0" smtClean="0"/>
+              <a:t>, </a:t>
+            </a:r>
+            <a:r>
+              <a:rPr lang="en-US" dirty="0" err="1" smtClean="0"/>
+              <a:t>boolean</a:t>
+            </a:r>
+            <a:r>
+              <a:rPr lang="en-US" dirty="0" smtClean="0"/>
+              <a:t> expected, </a:t>
+            </a:r>
+            <a:r>
+              <a:rPr lang="en-US" dirty="0" err="1" smtClean="0"/>
+              <a:t>boolean</a:t>
+            </a:r>
+            <a:r>
+              <a:rPr lang="en-US" dirty="0" smtClean="0"/>
+              <a:t> actual)</a:t>
+            </a:r>
+          </a:p>
+          <a:p>
+            <a:pPr>
+              <a:buClr>
+                <a:schemeClr val="accent3"/>
+              </a:buClr>
+            </a:pPr>
+            <a:r>
+              <a:rPr lang="en-US" dirty="0" smtClean="0"/>
+              <a:t>void </a:t>
+            </a:r>
+            <a:r>
+              <a:rPr lang="en-US" dirty="0" err="1" smtClean="0"/>
+              <a:t>assertTrue</a:t>
             </a:r>
             <a:r>
               <a:rPr lang="en-US" dirty="0"/>
@@ -3917,22 +4228,34 @@
             </a:r>
             <a:r>
               <a:rPr lang="en-US" dirty="0"/>
-              <a:t> condition</a:t>
+              <a:t> </a:t>
             </a:r>
             <a:r>
               <a:rPr lang="en-US" dirty="0" smtClean="0"/>
-              <a:t>)</a:t>
-            </a:r>
-            <a:endParaRPr lang="en-US" dirty="0" smtClean="0"/>
-          </a:p>
-          <a:p>
+              <a:t>expected, </a:t>
+            </a:r>
+            <a:r>
+              <a:rPr lang="en-US" dirty="0" err="1" smtClean="0"/>
+              <a:t>boolean</a:t>
+            </a:r>
+            <a:r>
+              <a:rPr lang="en-US" dirty="0" smtClean="0"/>
+              <a:t> actual)</a:t>
+            </a:r>
+          </a:p>
+          <a:p>
+            <a:pPr>
+              <a:buClr>
+                <a:schemeClr val="accent3"/>
+              </a:buClr>
+            </a:pPr>
             <a:r>
               <a:rPr lang="en-US" dirty="0" smtClean="0"/>
               <a:t>void </a:t>
             </a:r>
             <a:r>
               <a:rPr lang="en-US" dirty="0" err="1" smtClean="0"/>
-              <a:t>assertNotSame</a:t>
+              <a:t>assertFalse</a:t>
             </a:r>
             <a:r>
               <a:rPr lang="en-US" dirty="0"/>
@@ -3960,13 +4283,18 @@
             </a:r>
           </a:p>
           <a:p>
+            <a:pPr>
+              <a:buClr>
+                <a:schemeClr val="accent3"/>
+              </a:buClr>
+            </a:pPr>
             <a:r>
               <a:rPr lang="en-US" dirty="0" smtClean="0"/>
               <a:t>void </a:t>
             </a:r>
             <a:r>
               <a:rPr lang="en-US" dirty="0" err="1" smtClean="0"/>
-              <a:t>assertArrayEquals</a:t>
+              <a:t>assertNotNull</a:t>
             </a:r>
             <a:r>
               <a:rPr lang="en-US" dirty="0"/>
@@ -3978,26 +4306,50 @@
             </a:r>
             <a:r>
               <a:rPr lang="en-US" dirty="0"/>
-              <a:t>, </a:t>
+              <a:t>, Object </a:t>
+            </a:r>
+            <a:r>
+              <a:rPr lang="en-US" dirty="0" smtClean="0"/>
+              <a:t>object)</a:t>
+            </a:r>
+          </a:p>
+          <a:p>
+            <a:pPr>
+              <a:buClr>
+                <a:schemeClr val="accent3"/>
+              </a:buClr>
+            </a:pPr>
+            <a:r>
+              <a:rPr lang="en-US" dirty="0" smtClean="0"/>
+              <a:t>void </a:t>
+            </a:r>
+            <a:r>
+              <a:rPr lang="en-US" dirty="0" err="1" smtClean="0"/>
+              <a:t>assertNull</a:t>
+            </a:r>
+            <a:r>
+              <a:rPr lang="en-US" dirty="0"/>
+              <a:t>(string </a:t>
             </a:r>
             <a:r>
               <a:rPr lang="en-US" dirty="0" err="1"/>
-              <a:t>expectedArray</a:t>
+              <a:t>msg</a:t>
+            </a:r>
+            <a:r>
+              <a:rPr lang="en-US" dirty="0"/>
+              <a:t>, Object </a:t>
             </a:r>
             <a:r>
               <a:rPr lang="en-US" dirty="0" smtClean="0"/>
-              <a:t>, </a:t>
-            </a:r>
-            <a:r>
-              <a:rPr lang="en-US" dirty="0" err="1" smtClean="0"/>
-              <a:t>resultArray</a:t>
-            </a:r>
-            <a:r>
-              <a:rPr lang="en-US" dirty="0" smtClean="0"/>
-              <a:t>)</a:t>
-            </a:r>
-          </a:p>
-          <a:p>
+              <a:t>object)</a:t>
+            </a:r>
+          </a:p>
+          <a:p>
+            <a:pPr>
+              <a:buClr>
+                <a:schemeClr val="accent3"/>
+              </a:buClr>
+            </a:pPr>
             <a:endParaRPr lang="en-US" dirty="0"/>
           </a:p>
         </p:txBody>
@@ -4005,20 +4357,13 @@
     </p:spTree>
     <p:extLst>
       <p:ext uri="{BB962C8B-B14F-4D97-AF65-F5344CB8AC3E}">
-        <p14:creationId xmlns:p14="http://schemas.microsoft.com/office/powerpoint/2010/main" val="2974470257"/>
+        <p14:creationId xmlns:p14="http://schemas.microsoft.com/office/powerpoint/2010/main" val="2488630902"/>
       </p:ext>
     </p:extLst>
   </p:cSld>
   <p:clrMapOvr>
     <a:masterClrMapping/>
   </p:clrMapOvr>
-  <p:timing>
-    <p:tnLst>
-      <p:par>
-        <p:cTn xmlns:p14="http://schemas.microsoft.com/office/powerpoint/2010/main" id="1" dur="indefinite" restart="never" nodeType="tmRoot"/>
-      </p:par>
-    </p:tnLst>
-  </p:timing>
 </p:sld>
 </file>
 
@@ -4049,99 +4394,171 @@
             <p:ph type="title"/>
           </p:nvPr>
         </p:nvSpPr>
-        <p:spPr>
-          <a:xfrm>
-            <a:off x="457200" y="274638"/>
-            <a:ext cx="8229600" cy="730248"/>
-          </a:xfrm>
-        </p:spPr>
-        <p:txBody>
-          <a:bodyPr>
-            <a:normAutofit fontScale="90000"/>
-          </a:bodyPr>
-          <a:lstStyle/>
-          <a:p>
-            <a:r>
-              <a:rPr lang="en-US" dirty="0" err="1">
+        <p:spPr/>
+        <p:txBody>
+          <a:bodyPr/>
+          <a:lstStyle/>
+          <a:p>
+            <a:r>
+              <a:rPr lang="en-US" dirty="0">
                 <a:solidFill>
                   <a:srgbClr val="9BBB59"/>
                 </a:solidFill>
               </a:rPr>
-              <a:t>AssertThat</a:t>
-            </a:r>
-            <a:endParaRPr lang="en-US" dirty="0">
-              <a:solidFill>
-                <a:srgbClr val="9BBB59"/>
-              </a:solidFill>
-            </a:endParaRPr>
-          </a:p>
-        </p:txBody>
-      </p:sp>
-      <p:pic>
-        <p:nvPicPr>
-          <p:cNvPr id="4" name="Content Placeholder 3"/>
-          <p:cNvPicPr>
-            <a:picLocks noGrp="1" noChangeAspect="1"/>
-          </p:cNvPicPr>
+              <a:t>Asserts</a:t>
+            </a:r>
+          </a:p>
+        </p:txBody>
+      </p:sp>
+      <p:sp>
+        <p:nvSpPr>
+          <p:cNvPr id="3" name="Content Placeholder 2"/>
+          <p:cNvSpPr>
+            <a:spLocks noGrp="1"/>
+          </p:cNvSpPr>
           <p:nvPr>
             <p:ph idx="1"/>
           </p:nvPr>
-        </p:nvPicPr>
-        <p:blipFill>
-          <a:blip r:embed="rId2"/>
-          <a:srcRect l="-9119" r="-9119"/>
-          <a:stretch>
-            <a:fillRect/>
-          </a:stretch>
-        </p:blipFill>
-        <p:spPr>
-          <a:xfrm>
-            <a:off x="0" y="1004887"/>
-            <a:ext cx="9144000" cy="5457090"/>
-          </a:xfrm>
-        </p:spPr>
-      </p:pic>
-      <p:sp>
-        <p:nvSpPr>
-          <p:cNvPr id="5" name="TextBox 4"/>
-          <p:cNvSpPr txBox="1"/>
-          <p:nvPr/>
-        </p:nvSpPr>
-        <p:spPr>
-          <a:xfrm>
-            <a:off x="976850" y="6573631"/>
-            <a:ext cx="7563598" cy="246221"/>
-          </a:xfrm>
-          <a:prstGeom prst="rect">
-            <a:avLst/>
-          </a:prstGeom>
-          <a:noFill/>
-        </p:spPr>
-        <p:txBody>
-          <a:bodyPr wrap="square" rtlCol="0">
-            <a:spAutoFit/>
-          </a:bodyPr>
-          <a:lstStyle/>
-          <a:p>
-            <a:r>
-              <a:rPr lang="en-US" sz="1000" dirty="0"/>
-              <a:t>Source: https://</a:t>
-            </a:r>
-            <a:r>
-              <a:rPr lang="en-US" sz="1000" dirty="0" err="1"/>
-              <a:t>objectpartners.com</a:t>
-            </a:r>
-            <a:r>
-              <a:rPr lang="en-US" sz="1000" dirty="0"/>
-              <a:t>/2013/09/18/the-benefits-of-using-assertthat-over-other-assert-methods-in-unit-tests/</a:t>
-            </a:r>
+        </p:nvSpPr>
+        <p:spPr/>
+        <p:txBody>
+          <a:bodyPr/>
+          <a:lstStyle/>
+          <a:p>
+            <a:pPr>
+              <a:buClr>
+                <a:schemeClr val="accent3"/>
+              </a:buClr>
+            </a:pPr>
+            <a:r>
+              <a:rPr lang="en-US" dirty="0"/>
+              <a:t>void </a:t>
+            </a:r>
+            <a:r>
+              <a:rPr lang="en-US" dirty="0" err="1"/>
+              <a:t>assertSame</a:t>
+            </a:r>
+            <a:r>
+              <a:rPr lang="en-US" dirty="0"/>
+              <a:t>(string </a:t>
+            </a:r>
+            <a:r>
+              <a:rPr lang="en-US" dirty="0" err="1"/>
+              <a:t>msg</a:t>
+            </a:r>
+            <a:r>
+              <a:rPr lang="en-US" dirty="0"/>
+              <a:t>, </a:t>
+            </a:r>
+            <a:r>
+              <a:rPr lang="en-US" dirty="0" err="1"/>
+              <a:t>boolean</a:t>
+            </a:r>
+            <a:r>
+              <a:rPr lang="en-US" dirty="0"/>
+              <a:t> condition</a:t>
+            </a:r>
+            <a:r>
+              <a:rPr lang="en-US" dirty="0" smtClean="0"/>
+              <a:t>)</a:t>
+            </a:r>
+          </a:p>
+          <a:p>
+            <a:pPr>
+              <a:buClr>
+                <a:schemeClr val="accent3"/>
+              </a:buClr>
+            </a:pPr>
+            <a:r>
+              <a:rPr lang="en-US" dirty="0" smtClean="0"/>
+              <a:t>void </a:t>
+            </a:r>
+            <a:r>
+              <a:rPr lang="en-US" dirty="0" err="1" smtClean="0"/>
+              <a:t>assertNotSame</a:t>
+            </a:r>
+            <a:r>
+              <a:rPr lang="en-US" dirty="0"/>
+              <a:t>(string </a:t>
+            </a:r>
+            <a:r>
+              <a:rPr lang="en-US" dirty="0" err="1"/>
+              <a:t>msg</a:t>
+            </a:r>
+            <a:r>
+              <a:rPr lang="en-US" dirty="0"/>
+              <a:t>, </a:t>
+            </a:r>
+            <a:r>
+              <a:rPr lang="en-US" dirty="0" err="1"/>
+              <a:t>boolean</a:t>
+            </a:r>
+            <a:r>
+              <a:rPr lang="en-US" dirty="0"/>
+              <a:t> </a:t>
+            </a:r>
+            <a:r>
+              <a:rPr lang="en-US" dirty="0" smtClean="0"/>
+              <a:t>condition)</a:t>
+            </a:r>
+          </a:p>
+          <a:p>
+            <a:pPr>
+              <a:buClr>
+                <a:schemeClr val="accent3"/>
+              </a:buClr>
+            </a:pPr>
+            <a:r>
+              <a:rPr lang="en-US" dirty="0" smtClean="0"/>
+              <a:t>void </a:t>
+            </a:r>
+            <a:r>
+              <a:rPr lang="en-US" dirty="0" err="1" smtClean="0"/>
+              <a:t>assertArrayEquals</a:t>
+            </a:r>
+            <a:r>
+              <a:rPr lang="en-US" dirty="0"/>
+              <a:t>(string </a:t>
+            </a:r>
+            <a:r>
+              <a:rPr lang="en-US" dirty="0" err="1"/>
+              <a:t>msg</a:t>
+            </a:r>
+            <a:r>
+              <a:rPr lang="en-US" dirty="0"/>
+              <a:t>, </a:t>
+            </a:r>
+            <a:r>
+              <a:rPr lang="en-US" dirty="0" err="1"/>
+              <a:t>expectedArray</a:t>
+            </a:r>
+            <a:r>
+              <a:rPr lang="en-US" dirty="0" smtClean="0"/>
+              <a:t>, </a:t>
+            </a:r>
+            <a:r>
+              <a:rPr lang="en-US" dirty="0" err="1" smtClean="0"/>
+              <a:t>resultArray</a:t>
+            </a:r>
+            <a:r>
+              <a:rPr lang="en-US" dirty="0" smtClean="0"/>
+              <a:t>)</a:t>
+            </a:r>
+          </a:p>
+          <a:p>
+            <a:pPr>
+              <a:buClr>
+                <a:schemeClr val="accent3"/>
+              </a:buClr>
+            </a:pPr>
+            <a:endParaRPr lang="en-US" dirty="0"/>
           </a:p>
         </p:txBody>
       </p:sp>
     </p:spTree>
     <p:extLst>
       <p:ext uri="{BB962C8B-B14F-4D97-AF65-F5344CB8AC3E}">
-        <p14:creationId xmlns:p14="http://schemas.microsoft.com/office/powerpoint/2010/main" val="218734220"/>
+        <p14:creationId xmlns:p14="http://schemas.microsoft.com/office/powerpoint/2010/main" val="2974470257"/>
       </p:ext>
     </p:extLst>
   </p:cSld>
@@ -4185,18 +4602,25 @@
             <p:ph type="title"/>
           </p:nvPr>
         </p:nvSpPr>
-        <p:spPr/>
-        <p:txBody>
-          <a:bodyPr/>
-          <a:lstStyle/>
-          <a:p>
-            <a:r>
-              <a:rPr lang="en-US" dirty="0" smtClean="0">
+        <p:spPr>
+          <a:xfrm>
+            <a:off x="457200" y="274638"/>
+            <a:ext cx="8229600" cy="730248"/>
+          </a:xfrm>
+        </p:spPr>
+        <p:txBody>
+          <a:bodyPr>
+            <a:normAutofit fontScale="90000"/>
+          </a:bodyPr>
+          <a:lstStyle/>
+          <a:p>
+            <a:r>
+              <a:rPr lang="en-US" dirty="0" err="1">
                 <a:solidFill>
                   <a:srgbClr val="9BBB59"/>
                 </a:solidFill>
               </a:rPr>
-              <a:t>FIRST principle</a:t>
+              <a:t>AssertThat</a:t>
             </a:r>
             <a:endParaRPr lang="en-US" dirty="0">
               <a:solidFill>
@@ -4206,97 +4630,71 @@
           </a:p>
         </p:txBody>
       </p:sp>
-      <p:sp>
-        <p:nvSpPr>
-          <p:cNvPr id="3" name="Content Placeholder 2"/>
-          <p:cNvSpPr>
-            <a:spLocks noGrp="1"/>
-          </p:cNvSpPr>
+      <p:pic>
+        <p:nvPicPr>
+          <p:cNvPr id="4" name="Content Placeholder 3"/>
+          <p:cNvPicPr>
+            <a:picLocks noGrp="1" noChangeAspect="1"/>
+          </p:cNvPicPr>
           <p:nvPr>
             <p:ph idx="1"/>
           </p:nvPr>
-        </p:nvSpPr>
-        <p:spPr/>
-        <p:txBody>
-          <a:bodyPr/>
-          <a:lstStyle/>
-          <a:p>
-            <a:r>
-              <a:rPr lang="en-US" dirty="0" smtClean="0">
-                <a:solidFill>
-                  <a:srgbClr val="9BBB59"/>
-                </a:solidFill>
-              </a:rPr>
-              <a:t>F</a:t>
-            </a:r>
-            <a:r>
-              <a:rPr lang="en-US" dirty="0" smtClean="0"/>
-              <a:t>ast</a:t>
-            </a:r>
-          </a:p>
-          <a:p>
-            <a:r>
-              <a:rPr lang="en-US" dirty="0" smtClean="0">
-                <a:solidFill>
-                  <a:srgbClr val="9BBB59"/>
-                </a:solidFill>
-              </a:rPr>
-              <a:t>I</a:t>
-            </a:r>
-            <a:r>
-              <a:rPr lang="en-US" dirty="0" smtClean="0"/>
-              <a:t>solated</a:t>
-            </a:r>
-          </a:p>
-          <a:p>
-            <a:r>
-              <a:rPr lang="en-US" dirty="0" smtClean="0">
-                <a:solidFill>
-                  <a:srgbClr val="9BBB59"/>
-                </a:solidFill>
-              </a:rPr>
-              <a:t>R</a:t>
-            </a:r>
-            <a:r>
-              <a:rPr lang="en-US" dirty="0" smtClean="0"/>
-              <a:t>epeatable</a:t>
-            </a:r>
-          </a:p>
-          <a:p>
-            <a:r>
-              <a:rPr lang="en-US" dirty="0" smtClean="0">
-                <a:solidFill>
-                  <a:srgbClr val="9BBB59"/>
-                </a:solidFill>
-              </a:rPr>
-              <a:t>S</a:t>
-            </a:r>
-            <a:r>
-              <a:rPr lang="en-US" dirty="0" smtClean="0"/>
-              <a:t>elf-Validating/Self-explainable</a:t>
-            </a:r>
-          </a:p>
-          <a:p>
-            <a:r>
-              <a:rPr lang="en-US" dirty="0" smtClean="0">
-                <a:solidFill>
-                  <a:srgbClr val="9BBB59"/>
-                </a:solidFill>
-              </a:rPr>
-              <a:t>T</a:t>
-            </a:r>
-            <a:r>
-              <a:rPr lang="en-US" dirty="0" smtClean="0"/>
-              <a:t>imely</a:t>
-            </a:r>
-            <a:endParaRPr lang="en-US" dirty="0"/>
+        </p:nvPicPr>
+        <p:blipFill>
+          <a:blip r:embed="rId2"/>
+          <a:srcRect l="-9119" r="-9119"/>
+          <a:stretch>
+            <a:fillRect/>
+          </a:stretch>
+        </p:blipFill>
+        <p:spPr>
+          <a:xfrm>
+            <a:off x="0" y="1004887"/>
+            <a:ext cx="9144000" cy="5457090"/>
+          </a:xfrm>
+        </p:spPr>
+      </p:pic>
+      <p:sp>
+        <p:nvSpPr>
+          <p:cNvPr id="5" name="TextBox 4"/>
+          <p:cNvSpPr txBox="1"/>
+          <p:nvPr/>
+        </p:nvSpPr>
+        <p:spPr>
+          <a:xfrm>
+            <a:off x="976850" y="6573631"/>
+            <a:ext cx="7563598" cy="246221"/>
+          </a:xfrm>
+          <a:prstGeom prst="rect">
+            <a:avLst/>
+          </a:prstGeom>
+          <a:noFill/>
+        </p:spPr>
+        <p:txBody>
+          <a:bodyPr wrap="square" rtlCol="0">
+            <a:spAutoFit/>
+          </a:bodyPr>
+          <a:lstStyle/>
+          <a:p>
+            <a:r>
+              <a:rPr lang="en-US" sz="1000" dirty="0"/>
+              <a:t>Source: https://</a:t>
+            </a:r>
+            <a:r>
+              <a:rPr lang="en-US" sz="1000" dirty="0" err="1"/>
+              <a:t>objectpartners.com</a:t>
+            </a:r>
+            <a:r>
+              <a:rPr lang="en-US" sz="1000" dirty="0"/>
+              <a:t>/2013/09/18/the-benefits-of-using-assertthat-over-other-assert-methods-in-unit-tests/</a:t>
+            </a:r>
           </a:p>
         </p:txBody>
       </p:sp>
     </p:spTree>
     <p:extLst>
       <p:ext uri="{BB962C8B-B14F-4D97-AF65-F5344CB8AC3E}">
-        <p14:creationId xmlns:p14="http://schemas.microsoft.com/office/powerpoint/2010/main" val="2915670744"/>
+        <p14:creationId xmlns:p14="http://schemas.microsoft.com/office/powerpoint/2010/main" val="218734220"/>
       </p:ext>
     </p:extLst>
   </p:cSld>
@@ -4351,7 +4749,7 @@
                   <a:srgbClr val="9BBB59"/>
                 </a:solidFill>
               </a:rPr>
-              <a:t>Right-BICEP</a:t>
+              <a:t>FIRST principle</a:t>
             </a:r>
             <a:endParaRPr lang="en-US" dirty="0">
               <a:solidFill>
@@ -4371,150 +4769,87 @@
             <p:ph idx="1"/>
           </p:nvPr>
         </p:nvSpPr>
-        <p:spPr>
-          <a:xfrm>
-            <a:off x="457200" y="1600200"/>
-            <a:ext cx="8229600" cy="5057172"/>
-          </a:xfrm>
-        </p:spPr>
-        <p:txBody>
-          <a:bodyPr/>
-          <a:lstStyle/>
-          <a:p>
-            <a:r>
-              <a:rPr lang="en-US" dirty="0" smtClean="0"/>
-              <a:t>Are </a:t>
-            </a:r>
-            <a:r>
-              <a:rPr lang="en-US" dirty="0"/>
-              <a:t>the results </a:t>
-            </a:r>
-            <a:r>
-              <a:rPr lang="en-US" dirty="0">
-                <a:solidFill>
-                  <a:schemeClr val="accent3"/>
-                </a:solidFill>
-              </a:rPr>
-              <a:t>right</a:t>
-            </a:r>
-            <a:r>
-              <a:rPr lang="en-US" dirty="0"/>
-              <a:t>?</a:t>
-            </a:r>
-          </a:p>
-          <a:p>
-            <a:r>
-              <a:rPr lang="en-US" dirty="0" smtClean="0"/>
-              <a:t>Are </a:t>
-            </a:r>
-            <a:r>
-              <a:rPr lang="en-US" dirty="0"/>
-              <a:t>all the </a:t>
-            </a:r>
-            <a:r>
-              <a:rPr lang="en-US" dirty="0">
+        <p:spPr/>
+        <p:txBody>
+          <a:bodyPr/>
+          <a:lstStyle/>
+          <a:p>
+            <a:r>
+              <a:rPr lang="en-US" dirty="0" smtClean="0">
                 <a:solidFill>
                   <a:srgbClr val="9BBB59"/>
                 </a:solidFill>
               </a:rPr>
-              <a:t>boundary</a:t>
-            </a:r>
-            <a:r>
-              <a:rPr lang="en-US" dirty="0"/>
-              <a:t> conditions correct?</a:t>
-            </a:r>
-          </a:p>
-          <a:p>
+              <a:t>F</a:t>
+            </a:r>
             <a:r>
               <a:rPr lang="en-US" dirty="0" smtClean="0"/>
-              <a:t>Can </a:t>
-            </a:r>
-            <a:r>
-              <a:rPr lang="en-US" dirty="0"/>
-              <a:t>you check </a:t>
-            </a:r>
-            <a:r>
-              <a:rPr lang="en-US" dirty="0">
+              <a:t>ast</a:t>
+            </a:r>
+          </a:p>
+          <a:p>
+            <a:r>
+              <a:rPr lang="en-US" dirty="0" smtClean="0">
                 <a:solidFill>
                   <a:srgbClr val="9BBB59"/>
                 </a:solidFill>
               </a:rPr>
-              <a:t>inverse</a:t>
-            </a:r>
-            <a:r>
-              <a:rPr lang="en-US" dirty="0"/>
-              <a:t> relationships?</a:t>
-            </a:r>
-          </a:p>
-          <a:p>
+              <a:t>I</a:t>
+            </a:r>
             <a:r>
               <a:rPr lang="en-US" dirty="0" smtClean="0"/>
-              <a:t>Can </a:t>
-            </a:r>
-            <a:r>
-              <a:rPr lang="en-US" dirty="0"/>
-              <a:t>you </a:t>
-            </a:r>
-            <a:r>
-              <a:rPr lang="en-US" dirty="0">
+              <a:t>solated</a:t>
+            </a:r>
+          </a:p>
+          <a:p>
+            <a:r>
+              <a:rPr lang="en-US" dirty="0" smtClean="0">
                 <a:solidFill>
                   <a:srgbClr val="9BBB59"/>
                 </a:solidFill>
               </a:rPr>
-              <a:t>cross-check </a:t>
-            </a:r>
-            <a:r>
-              <a:rPr lang="en-US" dirty="0"/>
-              <a:t>results using other means? </a:t>
-            </a:r>
-            <a:endParaRPr lang="en-US" dirty="0" smtClean="0"/>
-          </a:p>
-          <a:p>
+              <a:t>R</a:t>
+            </a:r>
             <a:r>
               <a:rPr lang="en-US" dirty="0" smtClean="0"/>
-              <a:t>Can </a:t>
-            </a:r>
-            <a:r>
-              <a:rPr lang="en-US" dirty="0"/>
-              <a:t>you force </a:t>
-            </a:r>
-            <a:r>
-              <a:rPr lang="en-US" dirty="0">
+              <a:t>epeatable</a:t>
+            </a:r>
+          </a:p>
+          <a:p>
+            <a:r>
+              <a:rPr lang="en-US" dirty="0" smtClean="0">
                 <a:solidFill>
                   <a:srgbClr val="9BBB59"/>
                 </a:solidFill>
               </a:rPr>
-              <a:t>error</a:t>
-            </a:r>
-            <a:r>
-              <a:rPr lang="en-US" dirty="0"/>
-              <a:t> conditions to happen?</a:t>
-            </a:r>
-          </a:p>
-          <a:p>
+              <a:t>S</a:t>
+            </a:r>
             <a:r>
               <a:rPr lang="en-US" dirty="0" smtClean="0"/>
-              <a:t>Are </a:t>
-            </a:r>
-            <a:r>
-              <a:rPr lang="en-US" dirty="0">
+              <a:t>elf-Validating/Self-explainable</a:t>
+            </a:r>
+          </a:p>
+          <a:p>
+            <a:r>
+              <a:rPr lang="en-US" dirty="0" smtClean="0">
                 <a:solidFill>
                   <a:srgbClr val="9BBB59"/>
                 </a:solidFill>
               </a:rPr>
-              <a:t>performance</a:t>
-            </a:r>
-            <a:r>
-              <a:rPr lang="en-US" dirty="0"/>
-              <a:t> characteristics within bounds?</a:t>
-            </a:r>
+              <a:t>T</a:t>
+            </a:r>
+            <a:r>
+              <a:rPr lang="en-US" dirty="0" smtClean="0"/>
+              <a:t>imely</a:t>
+            </a:r>
+            <a:endParaRPr lang="en-US" dirty="0"/>
           </a:p>
         </p:txBody>
       </p:sp>
     </p:spTree>
     <p:extLst>
       <p:ext uri="{BB962C8B-B14F-4D97-AF65-F5344CB8AC3E}">
-        <p14:creationId xmlns:p14="http://schemas.microsoft.com/office/powerpoint/2010/main" val="3739334695"/>
+        <p14:creationId xmlns:p14="http://schemas.microsoft.com/office/powerpoint/2010/main" val="2915670744"/>
       </p:ext>
     </p:extLst>
   </p:cSld>
@@ -4569,7 +4904,7 @@
                   <a:srgbClr val="9BBB59"/>
                 </a:solidFill>
               </a:rPr>
-              <a:t>The CORRECT way</a:t>
+              <a:t>Right-BICEP</a:t>
             </a:r>
             <a:endParaRPr lang="en-US" dirty="0">
               <a:solidFill>
@@ -4592,125 +4927,190 @@
         <p:spPr>
           <a:xfrm>
             <a:off x="457200" y="1600200"/>
-            <a:ext cx="8229600" cy="4917604"/>
+            <a:ext cx="8229600" cy="5057172"/>
           </a:xfrm>
         </p:spPr>
         <p:txBody>
-          <a:bodyPr>
-            <a:normAutofit fontScale="85000" lnSpcReduction="20000"/>
-          </a:bodyPr>
-          <a:lstStyle/>
-          <a:p>
-            <a:r>
-              <a:rPr lang="en-US" dirty="0" smtClean="0">
+          <a:bodyPr/>
+          <a:lstStyle/>
+          <a:p>
+            <a:pPr>
+              <a:buClr>
+                <a:schemeClr val="accent3"/>
+              </a:buClr>
+            </a:pPr>
+            <a:r>
+              <a:rPr lang="en-US" dirty="0" smtClean="0"/>
+              <a:t>Are </a:t>
+            </a:r>
+            <a:r>
+              <a:rPr lang="en-US" dirty="0"/>
+              <a:t>the results </a:t>
+            </a:r>
+            <a:r>
+              <a:rPr lang="en-US" dirty="0">
+                <a:solidFill>
+                  <a:schemeClr val="accent3"/>
+                </a:solidFill>
+              </a:rPr>
+              <a:t>right</a:t>
+            </a:r>
+            <a:r>
+              <a:rPr lang="en-US" dirty="0"/>
+              <a:t>?</a:t>
+            </a:r>
+          </a:p>
+          <a:p>
+            <a:pPr>
+              <a:buClr>
+                <a:schemeClr val="accent3"/>
+              </a:buClr>
+            </a:pPr>
+            <a:r>
+              <a:rPr lang="en-US" dirty="0" smtClean="0"/>
+              <a:t>Are </a:t>
+            </a:r>
+            <a:r>
+              <a:rPr lang="en-US" dirty="0"/>
+              <a:t>all the </a:t>
+            </a:r>
+            <a:r>
+              <a:rPr lang="en-US" dirty="0">
                 <a:solidFill>
                   <a:srgbClr val="9BBB59"/>
                 </a:solidFill>
               </a:rPr>
-              <a:t>Conformance</a:t>
-            </a:r>
+              <a:t>boundary</a:t>
+            </a:r>
+            <a:r>
+              <a:rPr lang="en-US" dirty="0"/>
+              <a:t> conditions correct?</a:t>
+            </a:r>
+          </a:p>
+          <a:p>
+            <a:pPr>
+              <a:buClr>
+                <a:schemeClr val="accent3"/>
+              </a:buClr>
+            </a:pPr>
             <a:r>
               <a:rPr lang="en-US" dirty="0" smtClean="0"/>
-              <a:t>: Does the value conform to an expected format?</a:t>
-            </a:r>
-          </a:p>
-          <a:p>
-            <a:r>
-              <a:rPr lang="en-US" dirty="0" smtClean="0">
+              <a:t>Can </a:t>
+            </a:r>
+            <a:r>
+              <a:rPr lang="en-US" dirty="0"/>
+              <a:t>you check </a:t>
+            </a:r>
+            <a:r>
+              <a:rPr lang="en-US" dirty="0">
                 <a:solidFill>
                   <a:srgbClr val="9BBB59"/>
                 </a:solidFill>
               </a:rPr>
-              <a:t>Ordering</a:t>
-            </a:r>
+              <a:t>inverse</a:t>
+            </a:r>
+            <a:r>
+              <a:rPr lang="en-US" dirty="0"/>
+              <a:t> relationships?</a:t>
+            </a:r>
+          </a:p>
+          <a:p>
+            <a:pPr>
+              <a:buClr>
+                <a:schemeClr val="accent3"/>
+              </a:buClr>
+            </a:pPr>
             <a:r>
               <a:rPr lang="en-US" dirty="0" smtClean="0"/>
-              <a:t>: Is the set of values ordered or unordered as appropriate?</a:t>
-            </a:r>
-          </a:p>
-          <a:p>
-            <a:r>
-              <a:rPr lang="en-US" dirty="0" smtClean="0">
+              <a:t>Can </a:t>
+            </a:r>
+            <a:r>
+              <a:rPr lang="en-US" dirty="0"/>
+              <a:t>you </a:t>
+            </a:r>
+            <a:r>
+              <a:rPr lang="en-US" dirty="0">
                 <a:solidFill>
                   <a:srgbClr val="9BBB59"/>
                 </a:solidFill>
               </a:rPr>
-              <a:t>Range</a:t>
-            </a:r>
+              <a:t>cross-check </a:t>
+            </a:r>
+            <a:r>
+              <a:rPr lang="en-US" dirty="0"/>
+              <a:t>results using other means? </a:t>
+            </a:r>
+            <a:endParaRPr lang="en-US" dirty="0" smtClean="0"/>
+          </a:p>
+          <a:p>
+            <a:pPr>
+              <a:buClr>
+                <a:schemeClr val="accent3"/>
+              </a:buClr>
+            </a:pPr>
             <a:r>
               <a:rPr lang="en-US" dirty="0" smtClean="0"/>
-              <a:t>: Is the value within reasonable minimum and maximum values?</a:t>
-            </a:r>
-          </a:p>
-          <a:p>
-            <a:r>
-              <a:rPr lang="en-US" dirty="0" smtClean="0">
+              <a:t>Can </a:t>
+            </a:r>
+            <a:r>
+              <a:rPr lang="en-US" dirty="0"/>
+              <a:t>you force </a:t>
+            </a:r>
+            <a:r>
+              <a:rPr lang="en-US" dirty="0">
                 <a:solidFill>
                   <a:srgbClr val="9BBB59"/>
                 </a:solidFill>
               </a:rPr>
-              <a:t>Reference</a:t>
-            </a:r>
+              <a:t>error</a:t>
+            </a:r>
+            <a:r>
+              <a:rPr lang="en-US" dirty="0"/>
+              <a:t> conditions to happen?</a:t>
+            </a:r>
+          </a:p>
+          <a:p>
+            <a:pPr>
+              <a:buClr>
+                <a:schemeClr val="accent3"/>
+              </a:buClr>
+            </a:pPr>
             <a:r>
               <a:rPr lang="en-US" dirty="0" smtClean="0"/>
-              <a:t>: Does the code reference anything external that isn’t under direct control of the code itself?</a:t>
-            </a:r>
-          </a:p>
-          <a:p>
-            <a:r>
-              <a:rPr lang="en-US" dirty="0" smtClean="0">
+              <a:t>Are </a:t>
+            </a:r>
+            <a:r>
+              <a:rPr lang="en-US" dirty="0">
                 <a:solidFill>
                   <a:srgbClr val="9BBB59"/>
                 </a:solidFill>
               </a:rPr>
-              <a:t>Existence</a:t>
-            </a:r>
-            <a:r>
-              <a:rPr lang="en-US" dirty="0" smtClean="0"/>
-              <a:t>: Does the value exist (is it non-null, nonzero, present in a set, and so on)?</a:t>
-            </a:r>
-          </a:p>
-          <a:p>
-            <a:r>
-              <a:rPr lang="en-US" dirty="0" smtClean="0">
-                <a:solidFill>
-                  <a:srgbClr val="9BBB59"/>
-                </a:solidFill>
-              </a:rPr>
-              <a:t>Cardinality</a:t>
-            </a:r>
-            <a:r>
-              <a:rPr lang="en-US" dirty="0" smtClean="0"/>
-              <a:t>: Are there exactly enough values?</a:t>
-            </a:r>
-          </a:p>
-          <a:p>
-            <a:r>
-              <a:rPr lang="en-US" dirty="0" smtClean="0">
-                <a:solidFill>
-                  <a:srgbClr val="9BBB59"/>
-                </a:solidFill>
-              </a:rPr>
-              <a:t>Time</a:t>
-            </a:r>
-            <a:r>
-              <a:rPr lang="en-US" dirty="0" smtClean="0"/>
-              <a:t>: Is everything happening in order? At the right time? In time?</a:t>
-            </a:r>
-            <a:endParaRPr lang="en-US" dirty="0"/>
+              <a:t>performance</a:t>
+            </a:r>
+            <a:r>
+              <a:rPr lang="en-US" dirty="0"/>
+              <a:t> characteristics within bounds?</a:t>
+            </a:r>
           </a:p>
         </p:txBody>
       </p:sp>
     </p:spTree>
     <p:extLst>
       <p:ext uri="{BB962C8B-B14F-4D97-AF65-F5344CB8AC3E}">
-        <p14:creationId xmlns:p14="http://schemas.microsoft.com/office/powerpoint/2010/main" val="2637121010"/>
+        <p14:creationId xmlns:p14="http://schemas.microsoft.com/office/powerpoint/2010/main" val="3739334695"/>
       </p:ext>
     </p:extLst>
   </p:cSld>
   <p:clrMapOvr>
     <a:masterClrMapping/>
   </p:clrMapOvr>
+  <p:timing>
+    <p:tnLst>
+      <p:par>
+        <p:cTn xmlns:p14="http://schemas.microsoft.com/office/powerpoint/2010/main" id="1" dur="indefinite" restart="never" nodeType="tmRoot"/>
+      </p:par>
+    </p:tnLst>
+  </p:timing>
 </p:sld>
 </file>
 

</xml_diff>